<commit_message>
catch up day 2
</commit_message>
<xml_diff>
--- a/slides/Unit 2 - Class 6.pptx
+++ b/slides/Unit 2 - Class 6.pptx
@@ -8760,7 +8760,7 @@
           <a:graphicData uri="http://schemas.openxmlformats.org/presentationml/2006/ole">
             <mc:AlternateContent xmlns:mc="http://schemas.openxmlformats.org/markup-compatibility/2006">
               <mc:Choice xmlns:v="urn:schemas-microsoft-com:vml" Requires="v">
-                <p:oleObj spid="_x0000_s80957" name="Document" r:id="rId4" imgW="7556500" imgH="4686300" progId="Word.Document.12">
+                <p:oleObj spid="_x0000_s80959" name="Document" r:id="rId4" imgW="7556500" imgH="4686300" progId="Word.Document.12">
                   <p:embed/>
                 </p:oleObj>
               </mc:Choice>
@@ -10190,7 +10190,7 @@
           <a:graphicData uri="http://schemas.openxmlformats.org/presentationml/2006/ole">
             <mc:AlternateContent xmlns:mc="http://schemas.openxmlformats.org/markup-compatibility/2006">
               <mc:Choice xmlns:v="urn:schemas-microsoft-com:vml" Requires="v">
-                <p:oleObj spid="_x0000_s82996" name="Document" r:id="rId4" imgW="7556500" imgH="4470400" progId="Word.Document.12">
+                <p:oleObj spid="_x0000_s82998" name="Document" r:id="rId4" imgW="7556500" imgH="4470400" progId="Word.Document.12">
                   <p:embed/>
                 </p:oleObj>
               </mc:Choice>
@@ -10891,7 +10891,7 @@
           <a:graphicData uri="http://schemas.openxmlformats.org/presentationml/2006/ole">
             <mc:AlternateContent xmlns:mc="http://schemas.openxmlformats.org/markup-compatibility/2006">
               <mc:Choice xmlns:v="urn:schemas-microsoft-com:vml" Requires="v">
-                <p:oleObj spid="_x0000_s84017" name="Document" r:id="rId4" imgW="7556500" imgH="3441700" progId="Word.Document.12">
+                <p:oleObj spid="_x0000_s84019" name="Document" r:id="rId4" imgW="7556500" imgH="3441700" progId="Word.Document.12">
                   <p:embed/>
                 </p:oleObj>
               </mc:Choice>
@@ -11626,7 +11626,7 @@
           <a:graphicData uri="http://schemas.openxmlformats.org/presentationml/2006/ole">
             <mc:AlternateContent xmlns:mc="http://schemas.openxmlformats.org/markup-compatibility/2006">
               <mc:Choice xmlns:v="urn:schemas-microsoft-com:vml" Requires="v">
-                <p:oleObj spid="_x0000_s86064" name="Document" r:id="rId4" imgW="7556500" imgH="3441700" progId="Word.Document.12">
+                <p:oleObj spid="_x0000_s86066" name="Document" r:id="rId4" imgW="7556500" imgH="3441700" progId="Word.Document.12">
                   <p:embed/>
                 </p:oleObj>
               </mc:Choice>
@@ -12345,7 +12345,7 @@
           <a:graphicData uri="http://schemas.openxmlformats.org/presentationml/2006/ole">
             <mc:AlternateContent xmlns:mc="http://schemas.openxmlformats.org/markup-compatibility/2006">
               <mc:Choice xmlns:v="urn:schemas-microsoft-com:vml" Requires="v">
-                <p:oleObj spid="_x0000_s88108" name="Document" r:id="rId4" imgW="7556500" imgH="3962400" progId="Word.Document.12">
+                <p:oleObj spid="_x0000_s88110" name="Document" r:id="rId4" imgW="7556500" imgH="3962400" progId="Word.Document.12">
                   <p:embed/>
                 </p:oleObj>
               </mc:Choice>
@@ -13790,7 +13790,7 @@
               </a:lnSpc>
             </a:pPr>
             <a:r>
-              <a:rPr lang="en-US" sz="1300"/>
+              <a:rPr lang="en-US" sz="1300" dirty="0"/>
               <a:t>Right now – AppComponent has its own instance</a:t>
             </a:r>
           </a:p>
@@ -13801,7 +13801,7 @@
               </a:lnSpc>
             </a:pPr>
             <a:r>
-              <a:rPr lang="en-US" sz="1300"/>
+              <a:rPr lang="en-US" sz="1300" dirty="0"/>
               <a:t>As well as new-account and account have its own instance. </a:t>
             </a:r>
           </a:p>
@@ -13812,7 +13812,7 @@
               </a:lnSpc>
             </a:pPr>
             <a:r>
-              <a:rPr lang="en-US" sz="1300"/>
+              <a:rPr lang="en-US" sz="1300" dirty="0"/>
               <a:t>To fix this – remove from providers array but not constructor. </a:t>
             </a:r>
           </a:p>
@@ -13823,7 +13823,7 @@
               </a:lnSpc>
             </a:pPr>
             <a:r>
-              <a:rPr lang="en-US" sz="1300"/>
+              <a:rPr lang="en-US" sz="1300" dirty="0"/>
               <a:t>Understand if you want same instance of service or different instances.</a:t>
             </a:r>
           </a:p>
@@ -13834,9 +13834,30 @@
               </a:lnSpc>
             </a:pPr>
             <a:r>
-              <a:rPr lang="en-US" sz="1300"/>
-              <a:t>We could move the AccountsService from the providers in app.component.ts to the app.module.ts</a:t>
-            </a:r>
+              <a:rPr lang="en-US" sz="1300" dirty="0"/>
+              <a:t>We could move the </a:t>
+            </a:r>
+            <a:r>
+              <a:rPr lang="en-US" sz="1300" dirty="0" err="1"/>
+              <a:t>AccountsService</a:t>
+            </a:r>
+            <a:r>
+              <a:rPr lang="en-US" sz="1300" dirty="0"/>
+              <a:t> from the providers in </a:t>
+            </a:r>
+            <a:r>
+              <a:rPr lang="en-US" sz="1300" dirty="0" err="1"/>
+              <a:t>app.component.ts</a:t>
+            </a:r>
+            <a:r>
+              <a:rPr lang="en-US" sz="1300" dirty="0"/>
+              <a:t> to the </a:t>
+            </a:r>
+            <a:r>
+              <a:rPr lang="en-US" sz="1300" dirty="0" err="1"/>
+              <a:t>app.module.ts</a:t>
+            </a:r>
+            <a:endParaRPr lang="en-US" sz="1300" dirty="0"/>
           </a:p>
           <a:p>
             <a:pPr lvl="0">
@@ -13845,7 +13866,7 @@
               </a:lnSpc>
             </a:pPr>
             <a:r>
-              <a:rPr lang="en-US" sz="1300"/>
+              <a:rPr lang="en-US" sz="1300" dirty="0"/>
               <a:t>Now whole application gets same instance. </a:t>
             </a:r>
           </a:p>
@@ -13856,7 +13877,7 @@
               </a:lnSpc>
             </a:pPr>
             <a:r>
-              <a:rPr lang="en-US" sz="1300"/>
+              <a:rPr lang="en-US" sz="1300" dirty="0"/>
               <a:t>Can inject services into another service by adding that in the constructor of the dependent service. However, some meta-data is needed. @Injectable()</a:t>
             </a:r>
           </a:p>
@@ -13867,7 +13888,7 @@
               </a:lnSpc>
             </a:pPr>
             <a:r>
-              <a:rPr lang="en-US" sz="1300"/>
+              <a:rPr lang="en-US" sz="1300" dirty="0"/>
               <a:t>Recommended to use @Injectable everywhere.</a:t>
             </a:r>
           </a:p>
@@ -13877,7 +13898,7 @@
                 <a:spcPct val="90000"/>
               </a:lnSpc>
             </a:pPr>
-            <a:endParaRPr lang="en-US" sz="1300"/>
+            <a:endParaRPr lang="en-US" sz="1300" dirty="0"/>
           </a:p>
           <a:p>
             <a:pPr lvl="0">
@@ -13885,7 +13906,7 @@
                 <a:spcPct val="90000"/>
               </a:lnSpc>
             </a:pPr>
-            <a:endParaRPr lang="en-US" sz="1300"/>
+            <a:endParaRPr lang="en-US" sz="1300" dirty="0"/>
           </a:p>
           <a:p>
             <a:pPr lvl="0">
@@ -13893,7 +13914,7 @@
                 <a:spcPct val="90000"/>
               </a:lnSpc>
             </a:pPr>
-            <a:endParaRPr lang="en-US" sz="1300"/>
+            <a:endParaRPr lang="en-US" sz="1300" dirty="0"/>
           </a:p>
           <a:p>
             <a:pPr lvl="0">
@@ -13902,9 +13923,9 @@
               </a:lnSpc>
             </a:pPr>
             <a:br>
-              <a:rPr lang="en-US" sz="1300"/>
+              <a:rPr lang="en-US" sz="1300" dirty="0"/>
             </a:br>
-            <a:endParaRPr lang="en-US" sz="1300"/>
+            <a:endParaRPr lang="en-US" sz="1300" dirty="0"/>
           </a:p>
           <a:p>
             <a:pPr marL="457200" lvl="0" indent="-457200">
@@ -13915,7 +13936,7 @@
               <a:buFont typeface="Arial" pitchFamily="34"/>
               <a:buChar char="•"/>
             </a:pPr>
-            <a:endParaRPr lang="en-US" sz="1300"/>
+            <a:endParaRPr lang="en-US" sz="1300" dirty="0"/>
           </a:p>
         </p:txBody>
       </p:sp>
@@ -14103,7 +14124,7 @@
           <a:graphicData uri="http://schemas.openxmlformats.org/presentationml/2006/ole">
             <mc:AlternateContent xmlns:mc="http://schemas.openxmlformats.org/markup-compatibility/2006">
               <mc:Choice xmlns:v="urn:schemas-microsoft-com:vml" Requires="v">
-                <p:oleObj spid="_x0000_s89105" name="Document" r:id="rId4" imgW="7556500" imgH="5676900" progId="Word.Document.12">
+                <p:oleObj spid="_x0000_s89107" name="Document" r:id="rId4" imgW="7556500" imgH="5676900" progId="Word.Document.12">
                   <p:embed/>
                 </p:oleObj>
               </mc:Choice>
@@ -14920,7 +14941,7 @@
           <a:graphicData uri="http://schemas.openxmlformats.org/presentationml/2006/ole">
             <mc:AlternateContent xmlns:mc="http://schemas.openxmlformats.org/markup-compatibility/2006">
               <mc:Choice xmlns:v="urn:schemas-microsoft-com:vml" Requires="v">
-                <p:oleObj spid="_x0000_s90128" name="Document" r:id="rId4" imgW="7556500" imgH="5676900" progId="Word.Document.12">
+                <p:oleObj spid="_x0000_s90130" name="Document" r:id="rId4" imgW="7556500" imgH="5676900" progId="Word.Document.12">
                   <p:embed/>
                 </p:oleObj>
               </mc:Choice>
@@ -19010,7 +19031,7 @@
           <a:graphicData uri="http://schemas.openxmlformats.org/presentationml/2006/ole">
             <mc:AlternateContent xmlns:mc="http://schemas.openxmlformats.org/markup-compatibility/2006">
               <mc:Choice xmlns:v="urn:schemas-microsoft-com:vml" Requires="v">
-                <p:oleObj spid="_x0000_s73808" name="Document" r:id="rId4" imgW="7556500" imgH="1041400" progId="Word.Document.12">
+                <p:oleObj spid="_x0000_s73810" name="Document" r:id="rId4" imgW="7556500" imgH="1041400" progId="Word.Document.12">
                   <p:embed/>
                 </p:oleObj>
               </mc:Choice>
@@ -19650,7 +19671,13 @@
           <p:cNvGraphicFramePr>
             <a:graphicFrameLocks noChangeAspect="1"/>
           </p:cNvGraphicFramePr>
-          <p:nvPr/>
+          <p:nvPr>
+            <p:extLst>
+              <p:ext uri="{D42A27DB-BD31-4B8C-83A1-F6EECF244321}">
+                <p14:modId xmlns:p14="http://schemas.microsoft.com/office/powerpoint/2010/main" val="4052964028"/>
+              </p:ext>
+            </p:extLst>
+          </p:nvPr>
         </p:nvGraphicFramePr>
         <p:xfrm>
           <a:off x="1366838" y="4086225"/>
@@ -19660,7 +19687,7 @@
           <a:graphicData uri="http://schemas.openxmlformats.org/presentationml/2006/ole">
             <mc:AlternateContent xmlns:mc="http://schemas.openxmlformats.org/markup-compatibility/2006">
               <mc:Choice xmlns:v="urn:schemas-microsoft-com:vml" Requires="v">
-                <p:oleObj spid="_x0000_s76873" name="Document" r:id="rId4" imgW="7556500" imgH="1257300" progId="Word.Document.12">
+                <p:oleObj spid="_x0000_s76875" name="Document" r:id="rId4" imgW="7556500" imgH="1257300" progId="Word.Document.12">
                   <p:embed/>
                 </p:oleObj>
               </mc:Choice>
@@ -20929,7 +20956,7 @@
           <a:graphicData uri="http://schemas.openxmlformats.org/presentationml/2006/ole">
             <mc:AlternateContent xmlns:mc="http://schemas.openxmlformats.org/markup-compatibility/2006">
               <mc:Choice xmlns:v="urn:schemas-microsoft-com:vml" Requires="v">
-                <p:oleObj spid="_x0000_s78910" name="Document" r:id="rId4" imgW="7556500" imgH="4521200" progId="Word.Document.12">
+                <p:oleObj spid="_x0000_s78912" name="Document" r:id="rId4" imgW="7556500" imgH="4521200" progId="Word.Document.12">
                   <p:embed/>
                 </p:oleObj>
               </mc:Choice>

</xml_diff>